<commit_message>
Update STePS photo and tweak text
</commit_message>
<xml_diff>
--- a/diagrams/STePS-2016.pptx
+++ b/diagrams/STePS-2016.pptx
@@ -104,6 +104,11 @@
       </a:defRPr>
     </a:lvl9pPr>
   </p:defaultTextStyle>
+  <p:extLst>
+    <p:ext uri="{EFAFB233-063F-42B5-8137-9DF3F51BA10A}">
+      <p15:sldGuideLst xmlns:p15="http://schemas.microsoft.com/office/powerpoint/2012/main"/>
+    </p:ext>
+  </p:extLst>
 </p:presentation>
 </file>
 
@@ -238,7 +243,7 @@
           <a:p>
             <a:fld id="{29B3B8A0-A2EA-450A-9D2F-AAD424777961}" type="datetimeFigureOut">
               <a:rPr lang="en-US" smtClean="0"/>
-              <a:t>2017-11-24</a:t>
+              <a:t>2017-11-25</a:t>
             </a:fld>
             <a:endParaRPr lang="en-US"/>
           </a:p>
@@ -408,7 +413,7 @@
           <a:p>
             <a:fld id="{29B3B8A0-A2EA-450A-9D2F-AAD424777961}" type="datetimeFigureOut">
               <a:rPr lang="en-US" smtClean="0"/>
-              <a:t>2017-11-24</a:t>
+              <a:t>2017-11-25</a:t>
             </a:fld>
             <a:endParaRPr lang="en-US"/>
           </a:p>
@@ -588,7 +593,7 @@
           <a:p>
             <a:fld id="{29B3B8A0-A2EA-450A-9D2F-AAD424777961}" type="datetimeFigureOut">
               <a:rPr lang="en-US" smtClean="0"/>
-              <a:t>2017-11-24</a:t>
+              <a:t>2017-11-25</a:t>
             </a:fld>
             <a:endParaRPr lang="en-US"/>
           </a:p>
@@ -758,7 +763,7 @@
           <a:p>
             <a:fld id="{29B3B8A0-A2EA-450A-9D2F-AAD424777961}" type="datetimeFigureOut">
               <a:rPr lang="en-US" smtClean="0"/>
-              <a:t>2017-11-24</a:t>
+              <a:t>2017-11-25</a:t>
             </a:fld>
             <a:endParaRPr lang="en-US"/>
           </a:p>
@@ -1004,7 +1009,7 @@
           <a:p>
             <a:fld id="{29B3B8A0-A2EA-450A-9D2F-AAD424777961}" type="datetimeFigureOut">
               <a:rPr lang="en-US" smtClean="0"/>
-              <a:t>2017-11-24</a:t>
+              <a:t>2017-11-25</a:t>
             </a:fld>
             <a:endParaRPr lang="en-US"/>
           </a:p>
@@ -1236,7 +1241,7 @@
           <a:p>
             <a:fld id="{29B3B8A0-A2EA-450A-9D2F-AAD424777961}" type="datetimeFigureOut">
               <a:rPr lang="en-US" smtClean="0"/>
-              <a:t>2017-11-24</a:t>
+              <a:t>2017-11-25</a:t>
             </a:fld>
             <a:endParaRPr lang="en-US"/>
           </a:p>
@@ -1603,7 +1608,7 @@
           <a:p>
             <a:fld id="{29B3B8A0-A2EA-450A-9D2F-AAD424777961}" type="datetimeFigureOut">
               <a:rPr lang="en-US" smtClean="0"/>
-              <a:t>2017-11-24</a:t>
+              <a:t>2017-11-25</a:t>
             </a:fld>
             <a:endParaRPr lang="en-US"/>
           </a:p>
@@ -1721,7 +1726,7 @@
           <a:p>
             <a:fld id="{29B3B8A0-A2EA-450A-9D2F-AAD424777961}" type="datetimeFigureOut">
               <a:rPr lang="en-US" smtClean="0"/>
-              <a:t>2017-11-24</a:t>
+              <a:t>2017-11-25</a:t>
             </a:fld>
             <a:endParaRPr lang="en-US"/>
           </a:p>
@@ -1816,7 +1821,7 @@
           <a:p>
             <a:fld id="{29B3B8A0-A2EA-450A-9D2F-AAD424777961}" type="datetimeFigureOut">
               <a:rPr lang="en-US" smtClean="0"/>
-              <a:t>2017-11-24</a:t>
+              <a:t>2017-11-25</a:t>
             </a:fld>
             <a:endParaRPr lang="en-US"/>
           </a:p>
@@ -2093,7 +2098,7 @@
           <a:p>
             <a:fld id="{29B3B8A0-A2EA-450A-9D2F-AAD424777961}" type="datetimeFigureOut">
               <a:rPr lang="en-US" smtClean="0"/>
-              <a:t>2017-11-24</a:t>
+              <a:t>2017-11-25</a:t>
             </a:fld>
             <a:endParaRPr lang="en-US"/>
           </a:p>
@@ -2346,7 +2351,7 @@
           <a:p>
             <a:fld id="{29B3B8A0-A2EA-450A-9D2F-AAD424777961}" type="datetimeFigureOut">
               <a:rPr lang="en-US" smtClean="0"/>
-              <a:t>2017-11-24</a:t>
+              <a:t>2017-11-25</a:t>
             </a:fld>
             <a:endParaRPr lang="en-US"/>
           </a:p>
@@ -2559,7 +2564,7 @@
           <a:p>
             <a:fld id="{29B3B8A0-A2EA-450A-9D2F-AAD424777961}" type="datetimeFigureOut">
               <a:rPr lang="en-US" smtClean="0"/>
-              <a:t>2017-11-24</a:t>
+              <a:t>2017-11-25</a:t>
             </a:fld>
             <a:endParaRPr lang="en-US"/>
           </a:p>
@@ -2966,13 +2971,13 @@
       </p:grpSpPr>
       <p:pic>
         <p:nvPicPr>
-          <p:cNvPr id="4" name="Picture 3"/>
+          <p:cNvPr id="6" name="Picture 5"/>
           <p:cNvPicPr>
             <a:picLocks noChangeAspect="1"/>
           </p:cNvPicPr>
           <p:nvPr/>
         </p:nvPicPr>
-        <p:blipFill>
+        <p:blipFill rotWithShape="1">
           <a:blip r:embed="rId2" cstate="print">
             <a:extLst>
               <a:ext uri="{28A0092B-C50C-407E-A947-70E740481C1C}">
@@ -2980,25 +2985,58 @@
               </a:ext>
             </a:extLst>
           </a:blip>
-          <a:stretch>
-            <a:fillRect/>
-          </a:stretch>
+          <a:srcRect b="6880"/>
+          <a:stretch/>
         </p:blipFill>
         <p:spPr>
           <a:xfrm>
-            <a:off x="4293235" y="2227157"/>
-            <a:ext cx="3605531" cy="2403686"/>
+            <a:off x="475836" y="3345744"/>
+            <a:ext cx="3605531" cy="2238310"/>
           </a:xfrm>
           <a:prstGeom prst="rect">
             <a:avLst/>
           </a:prstGeom>
-          <a:effectLst>
-            <a:outerShdw blurRad="63500" sx="102000" sy="102000" algn="ctr" rotWithShape="0">
-              <a:prstClr val="black">
-                <a:alpha val="40000"/>
-              </a:prstClr>
-            </a:outerShdw>
-          </a:effectLst>
+          <a:ln w="28575">
+            <a:solidFill>
+              <a:schemeClr val="bg1"/>
+            </a:solidFill>
+          </a:ln>
+          <a:effectLst/>
+        </p:spPr>
+      </p:pic>
+      <p:pic>
+        <p:nvPicPr>
+          <p:cNvPr id="4" name="Picture 3"/>
+          <p:cNvPicPr>
+            <a:picLocks noChangeAspect="1"/>
+          </p:cNvPicPr>
+          <p:nvPr/>
+        </p:nvPicPr>
+        <p:blipFill rotWithShape="1">
+          <a:blip r:embed="rId3" cstate="print">
+            <a:extLst>
+              <a:ext uri="{28A0092B-C50C-407E-A947-70E740481C1C}">
+                <a14:useLocalDpi xmlns:a14="http://schemas.microsoft.com/office/drawing/2010/main" val="0"/>
+              </a:ext>
+            </a:extLst>
+          </a:blip>
+          <a:srcRect l="3546" b="7249"/>
+          <a:stretch/>
+        </p:blipFill>
+        <p:spPr>
+          <a:xfrm>
+            <a:off x="2867480" y="3345744"/>
+            <a:ext cx="3477686" cy="2229433"/>
+          </a:xfrm>
+          <a:prstGeom prst="rect">
+            <a:avLst/>
+          </a:prstGeom>
+          <a:ln w="28575">
+            <a:solidFill>
+              <a:schemeClr val="bg1"/>
+            </a:solidFill>
+          </a:ln>
+          <a:effectLst/>
         </p:spPr>
       </p:pic>
       <p:pic>
@@ -3009,44 +3047,7 @@
           </p:cNvPicPr>
           <p:nvPr/>
         </p:nvPicPr>
-        <p:blipFill>
-          <a:blip r:embed="rId3" cstate="print">
-            <a:extLst>
-              <a:ext uri="{28A0092B-C50C-407E-A947-70E740481C1C}">
-                <a14:useLocalDpi xmlns:a14="http://schemas.microsoft.com/office/drawing/2010/main" val="0"/>
-              </a:ext>
-            </a:extLst>
-          </a:blip>
-          <a:stretch>
-            <a:fillRect/>
-          </a:stretch>
-        </p:blipFill>
-        <p:spPr>
-          <a:xfrm>
-            <a:off x="7968591" y="2227157"/>
-            <a:ext cx="3605531" cy="2403686"/>
-          </a:xfrm>
-          <a:prstGeom prst="rect">
-            <a:avLst/>
-          </a:prstGeom>
-          <a:effectLst>
-            <a:outerShdw blurRad="63500" sx="102000" sy="102000" algn="ctr" rotWithShape="0">
-              <a:prstClr val="black">
-                <a:alpha val="40000"/>
-              </a:prstClr>
-            </a:outerShdw>
-          </a:effectLst>
-        </p:spPr>
-      </p:pic>
-      <p:pic>
-        <p:nvPicPr>
-          <p:cNvPr id="6" name="Picture 5"/>
-          <p:cNvPicPr>
-            <a:picLocks noChangeAspect="1"/>
-          </p:cNvPicPr>
-          <p:nvPr/>
-        </p:nvPicPr>
-        <p:blipFill>
+        <p:blipFill rotWithShape="1">
           <a:blip r:embed="rId4" cstate="print">
             <a:extLst>
               <a:ext uri="{28A0092B-C50C-407E-A947-70E740481C1C}">
@@ -3054,25 +3055,88 @@
               </a:ext>
             </a:extLst>
           </a:blip>
+          <a:srcRect b="7619"/>
+          <a:stretch/>
+        </p:blipFill>
+        <p:spPr>
+          <a:xfrm>
+            <a:off x="5198750" y="3345744"/>
+            <a:ext cx="3605531" cy="2220555"/>
+          </a:xfrm>
+          <a:prstGeom prst="rect">
+            <a:avLst/>
+          </a:prstGeom>
+          <a:ln w="28575">
+            <a:solidFill>
+              <a:schemeClr val="bg1"/>
+            </a:solidFill>
+          </a:ln>
+          <a:effectLst/>
+        </p:spPr>
+      </p:pic>
+      <p:pic>
+        <p:nvPicPr>
+          <p:cNvPr id="3" name="Picture 2"/>
+          <p:cNvPicPr>
+            <a:picLocks noChangeAspect="1"/>
+          </p:cNvPicPr>
+          <p:nvPr/>
+        </p:nvPicPr>
+        <p:blipFill>
+          <a:blip r:embed="rId5"/>
           <a:stretch>
             <a:fillRect/>
           </a:stretch>
         </p:blipFill>
         <p:spPr>
           <a:xfrm>
-            <a:off x="617879" y="2227157"/>
-            <a:ext cx="3605531" cy="2403686"/>
+            <a:off x="6149857" y="1757042"/>
+            <a:ext cx="2654424" cy="1806943"/>
           </a:xfrm>
           <a:prstGeom prst="rect">
             <a:avLst/>
           </a:prstGeom>
-          <a:effectLst>
-            <a:outerShdw blurRad="63500" sx="102000" sy="102000" algn="ctr" rotWithShape="0">
-              <a:prstClr val="black">
-                <a:alpha val="40000"/>
-              </a:prstClr>
-            </a:outerShdw>
-          </a:effectLst>
+          <a:ln w="28575">
+            <a:solidFill>
+              <a:schemeClr val="bg1"/>
+            </a:solidFill>
+          </a:ln>
+          <a:effectLst/>
+        </p:spPr>
+      </p:pic>
+      <p:pic>
+        <p:nvPicPr>
+          <p:cNvPr id="2" name="Picture 1"/>
+          <p:cNvPicPr>
+            <a:picLocks noChangeAspect="1"/>
+          </p:cNvPicPr>
+          <p:nvPr/>
+        </p:nvPicPr>
+        <p:blipFill rotWithShape="1">
+          <a:blip r:embed="rId6" cstate="screen">
+            <a:extLst>
+              <a:ext uri="{28A0092B-C50C-407E-A947-70E740481C1C}">
+                <a14:useLocalDpi xmlns:a14="http://schemas.microsoft.com/office/drawing/2010/main"/>
+              </a:ext>
+            </a:extLst>
+          </a:blip>
+          <a:srcRect l="5628" t="8564"/>
+          <a:stretch/>
+        </p:blipFill>
+        <p:spPr>
+          <a:xfrm>
+            <a:off x="475836" y="1757042"/>
+            <a:ext cx="5687900" cy="1806943"/>
+          </a:xfrm>
+          <a:prstGeom prst="rect">
+            <a:avLst/>
+          </a:prstGeom>
+          <a:ln w="28575">
+            <a:solidFill>
+              <a:schemeClr val="bg1"/>
+            </a:solidFill>
+          </a:ln>
+          <a:effectLst/>
         </p:spPr>
       </p:pic>
     </p:spTree>

</xml_diff>